<commit_message>
Fix: Relecture du chapitre 7 et correction
</commit_message>
<xml_diff>
--- a/source/Chapitre 7 - Les exceptions.pptx
+++ b/source/Chapitre 7 - Les exceptions.pptx
@@ -147,7 +147,7 @@
   <pc:docChgLst>
     <pc:chgData name="Ismaël Tuo" userId="fca7baf0e513a1e6" providerId="LiveId" clId="{EED602D2-F677-4216-A5DC-4FF8DE656DE4}"/>
     <pc:docChg chg="undo custSel addSld delSld modSld sldOrd">
-      <pc:chgData name="Ismaël Tuo" userId="fca7baf0e513a1e6" providerId="LiveId" clId="{EED602D2-F677-4216-A5DC-4FF8DE656DE4}" dt="2023-11-12T17:58:41.368" v="14717" actId="1076"/>
+      <pc:chgData name="Ismaël Tuo" userId="fca7baf0e513a1e6" providerId="LiveId" clId="{EED602D2-F677-4216-A5DC-4FF8DE656DE4}" dt="2024-01-14T10:56:08.974" v="14853" actId="20577"/>
       <pc:docMkLst>
         <pc:docMk/>
       </pc:docMkLst>
@@ -182,7 +182,7 @@
         </pc:spChg>
       </pc:sldChg>
       <pc:sldChg chg="modSp mod">
-        <pc:chgData name="Ismaël Tuo" userId="fca7baf0e513a1e6" providerId="LiveId" clId="{EED602D2-F677-4216-A5DC-4FF8DE656DE4}" dt="2023-11-12T15:38:09.275" v="9925" actId="113"/>
+        <pc:chgData name="Ismaël Tuo" userId="fca7baf0e513a1e6" providerId="LiveId" clId="{EED602D2-F677-4216-A5DC-4FF8DE656DE4}" dt="2024-01-14T10:45:05.247" v="14808" actId="20577"/>
         <pc:sldMkLst>
           <pc:docMk/>
           <pc:sldMk cId="1268069196" sldId="285"/>
@@ -196,7 +196,7 @@
           </ac:spMkLst>
         </pc:spChg>
         <pc:spChg chg="mod">
-          <ac:chgData name="Ismaël Tuo" userId="fca7baf0e513a1e6" providerId="LiveId" clId="{EED602D2-F677-4216-A5DC-4FF8DE656DE4}" dt="2023-11-12T15:36:40.834" v="9910" actId="114"/>
+          <ac:chgData name="Ismaël Tuo" userId="fca7baf0e513a1e6" providerId="LiveId" clId="{EED602D2-F677-4216-A5DC-4FF8DE656DE4}" dt="2024-01-14T10:45:05.247" v="14808" actId="20577"/>
           <ac:spMkLst>
             <pc:docMk/>
             <pc:sldMk cId="1268069196" sldId="285"/>
@@ -205,7 +205,7 @@
         </pc:spChg>
       </pc:sldChg>
       <pc:sldChg chg="addSp delSp modSp mod">
-        <pc:chgData name="Ismaël Tuo" userId="fca7baf0e513a1e6" providerId="LiveId" clId="{EED602D2-F677-4216-A5DC-4FF8DE656DE4}" dt="2023-11-12T15:38:15.857" v="9926" actId="113"/>
+        <pc:chgData name="Ismaël Tuo" userId="fca7baf0e513a1e6" providerId="LiveId" clId="{EED602D2-F677-4216-A5DC-4FF8DE656DE4}" dt="2024-01-14T10:27:29.556" v="14721" actId="20577"/>
         <pc:sldMkLst>
           <pc:docMk/>
           <pc:sldMk cId="2639441608" sldId="286"/>
@@ -243,7 +243,7 @@
           </ac:spMkLst>
         </pc:spChg>
         <pc:spChg chg="add mod">
-          <ac:chgData name="Ismaël Tuo" userId="fca7baf0e513a1e6" providerId="LiveId" clId="{EED602D2-F677-4216-A5DC-4FF8DE656DE4}" dt="2023-10-14T14:31:34.408" v="2185" actId="20577"/>
+          <ac:chgData name="Ismaël Tuo" userId="fca7baf0e513a1e6" providerId="LiveId" clId="{EED602D2-F677-4216-A5DC-4FF8DE656DE4}" dt="2024-01-14T10:27:29.556" v="14721" actId="20577"/>
           <ac:spMkLst>
             <pc:docMk/>
             <pc:sldMk cId="2639441608" sldId="286"/>
@@ -251,7 +251,7 @@
           </ac:spMkLst>
         </pc:spChg>
         <pc:spChg chg="mod">
-          <ac:chgData name="Ismaël Tuo" userId="fca7baf0e513a1e6" providerId="LiveId" clId="{EED602D2-F677-4216-A5DC-4FF8DE656DE4}" dt="2023-11-12T10:48:55.449" v="2261" actId="20577"/>
+          <ac:chgData name="Ismaël Tuo" userId="fca7baf0e513a1e6" providerId="LiveId" clId="{EED602D2-F677-4216-A5DC-4FF8DE656DE4}" dt="2024-01-14T10:26:39.070" v="14718" actId="20577"/>
           <ac:spMkLst>
             <pc:docMk/>
             <pc:sldMk cId="2639441608" sldId="286"/>
@@ -332,7 +332,7 @@
         </pc:cxnChg>
       </pc:sldChg>
       <pc:sldChg chg="addSp delSp modSp mod">
-        <pc:chgData name="Ismaël Tuo" userId="fca7baf0e513a1e6" providerId="LiveId" clId="{EED602D2-F677-4216-A5DC-4FF8DE656DE4}" dt="2023-11-12T16:51:57.781" v="14700" actId="113"/>
+        <pc:chgData name="Ismaël Tuo" userId="fca7baf0e513a1e6" providerId="LiveId" clId="{EED602D2-F677-4216-A5DC-4FF8DE656DE4}" dt="2024-01-14T10:52:47.644" v="14821" actId="20577"/>
         <pc:sldMkLst>
           <pc:docMk/>
           <pc:sldMk cId="335285156" sldId="296"/>
@@ -362,7 +362,7 @@
           </ac:spMkLst>
         </pc:spChg>
         <pc:spChg chg="add mod">
-          <ac:chgData name="Ismaël Tuo" userId="fca7baf0e513a1e6" providerId="LiveId" clId="{EED602D2-F677-4216-A5DC-4FF8DE656DE4}" dt="2023-11-12T16:24:05.280" v="12488" actId="20577"/>
+          <ac:chgData name="Ismaël Tuo" userId="fca7baf0e513a1e6" providerId="LiveId" clId="{EED602D2-F677-4216-A5DC-4FF8DE656DE4}" dt="2024-01-14T10:52:47.644" v="14821" actId="20577"/>
           <ac:spMkLst>
             <pc:docMk/>
             <pc:sldMk cId="335285156" sldId="296"/>
@@ -371,7 +371,7 @@
         </pc:spChg>
       </pc:sldChg>
       <pc:sldChg chg="addSp delSp modSp add mod">
-        <pc:chgData name="Ismaël Tuo" userId="fca7baf0e513a1e6" providerId="LiveId" clId="{EED602D2-F677-4216-A5DC-4FF8DE656DE4}" dt="2023-11-12T15:38:21.072" v="9927" actId="113"/>
+        <pc:chgData name="Ismaël Tuo" userId="fca7baf0e513a1e6" providerId="LiveId" clId="{EED602D2-F677-4216-A5DC-4FF8DE656DE4}" dt="2024-01-14T10:29:01.633" v="14742" actId="20577"/>
         <pc:sldMkLst>
           <pc:docMk/>
           <pc:sldMk cId="657992875" sldId="297"/>
@@ -393,7 +393,7 @@
           </ac:spMkLst>
         </pc:spChg>
         <pc:spChg chg="add mod">
-          <ac:chgData name="Ismaël Tuo" userId="fca7baf0e513a1e6" providerId="LiveId" clId="{EED602D2-F677-4216-A5DC-4FF8DE656DE4}" dt="2023-10-14T14:32:11.715" v="2190" actId="20577"/>
+          <ac:chgData name="Ismaël Tuo" userId="fca7baf0e513a1e6" providerId="LiveId" clId="{EED602D2-F677-4216-A5DC-4FF8DE656DE4}" dt="2024-01-14T10:28:12.640" v="14728" actId="313"/>
           <ac:spMkLst>
             <pc:docMk/>
             <pc:sldMk cId="657992875" sldId="297"/>
@@ -417,7 +417,7 @@
           </ac:spMkLst>
         </pc:spChg>
         <pc:spChg chg="add mod">
-          <ac:chgData name="Ismaël Tuo" userId="fca7baf0e513a1e6" providerId="LiveId" clId="{EED602D2-F677-4216-A5DC-4FF8DE656DE4}" dt="2023-11-12T10:51:03.337" v="2276" actId="20577"/>
+          <ac:chgData name="Ismaël Tuo" userId="fca7baf0e513a1e6" providerId="LiveId" clId="{EED602D2-F677-4216-A5DC-4FF8DE656DE4}" dt="2024-01-14T10:29:01.633" v="14742" actId="20577"/>
           <ac:spMkLst>
             <pc:docMk/>
             <pc:sldMk cId="657992875" sldId="297"/>
@@ -535,7 +535,7 @@
         </pc:sldMkLst>
       </pc:sldChg>
       <pc:sldChg chg="addSp modSp add mod">
-        <pc:chgData name="Ismaël Tuo" userId="fca7baf0e513a1e6" providerId="LiveId" clId="{EED602D2-F677-4216-A5DC-4FF8DE656DE4}" dt="2023-11-12T15:39:26.246" v="9930" actId="113"/>
+        <pc:chgData name="Ismaël Tuo" userId="fca7baf0e513a1e6" providerId="LiveId" clId="{EED602D2-F677-4216-A5DC-4FF8DE656DE4}" dt="2024-01-14T10:37:17.552" v="14754" actId="20577"/>
         <pc:sldMkLst>
           <pc:docMk/>
           <pc:sldMk cId="3566762566" sldId="299"/>
@@ -557,7 +557,7 @@
           </ac:spMkLst>
         </pc:spChg>
         <pc:spChg chg="add mod">
-          <ac:chgData name="Ismaël Tuo" userId="fca7baf0e513a1e6" providerId="LiveId" clId="{EED602D2-F677-4216-A5DC-4FF8DE656DE4}" dt="2023-11-12T15:38:02.885" v="9924" actId="114"/>
+          <ac:chgData name="Ismaël Tuo" userId="fca7baf0e513a1e6" providerId="LiveId" clId="{EED602D2-F677-4216-A5DC-4FF8DE656DE4}" dt="2024-01-14T10:37:17.552" v="14754" actId="20577"/>
           <ac:spMkLst>
             <pc:docMk/>
             <pc:sldMk cId="3566762566" sldId="299"/>
@@ -581,7 +581,7 @@
         </pc:sldMkLst>
       </pc:sldChg>
       <pc:sldChg chg="addSp delSp modSp add mod">
-        <pc:chgData name="Ismaël Tuo" userId="fca7baf0e513a1e6" providerId="LiveId" clId="{EED602D2-F677-4216-A5DC-4FF8DE656DE4}" dt="2023-11-12T15:41:05.519" v="9953" actId="114"/>
+        <pc:chgData name="Ismaël Tuo" userId="fca7baf0e513a1e6" providerId="LiveId" clId="{EED602D2-F677-4216-A5DC-4FF8DE656DE4}" dt="2024-01-14T10:42:50.665" v="14776" actId="1076"/>
         <pc:sldMkLst>
           <pc:docMk/>
           <pc:sldMk cId="3618396490" sldId="300"/>
@@ -595,7 +595,7 @@
           </ac:spMkLst>
         </pc:spChg>
         <pc:spChg chg="mod">
-          <ac:chgData name="Ismaël Tuo" userId="fca7baf0e513a1e6" providerId="LiveId" clId="{EED602D2-F677-4216-A5DC-4FF8DE656DE4}" dt="2023-11-12T15:41:05.519" v="9953" actId="114"/>
+          <ac:chgData name="Ismaël Tuo" userId="fca7baf0e513a1e6" providerId="LiveId" clId="{EED602D2-F677-4216-A5DC-4FF8DE656DE4}" dt="2024-01-14T10:39:29.971" v="14769" actId="20577"/>
           <ac:spMkLst>
             <pc:docMk/>
             <pc:sldMk cId="3618396490" sldId="300"/>
@@ -619,7 +619,15 @@
           </ac:picMkLst>
         </pc:picChg>
         <pc:picChg chg="add mod">
-          <ac:chgData name="Ismaël Tuo" userId="fca7baf0e513a1e6" providerId="LiveId" clId="{EED602D2-F677-4216-A5DC-4FF8DE656DE4}" dt="2023-11-12T14:57:58.938" v="7229" actId="1076"/>
+          <ac:chgData name="Ismaël Tuo" userId="fca7baf0e513a1e6" providerId="LiveId" clId="{EED602D2-F677-4216-A5DC-4FF8DE656DE4}" dt="2024-01-14T10:42:48.109" v="14775" actId="1076"/>
+          <ac:picMkLst>
+            <pc:docMk/>
+            <pc:sldMk cId="3618396490" sldId="300"/>
+            <ac:picMk id="7" creationId="{EADB19E2-3CD0-146C-A8F9-F3E1FD6EDD5A}"/>
+          </ac:picMkLst>
+        </pc:picChg>
+        <pc:picChg chg="add del mod">
+          <ac:chgData name="Ismaël Tuo" userId="fca7baf0e513a1e6" providerId="LiveId" clId="{EED602D2-F677-4216-A5DC-4FF8DE656DE4}" dt="2024-01-14T10:42:33.927" v="14770" actId="478"/>
           <ac:picMkLst>
             <pc:docMk/>
             <pc:sldMk cId="3618396490" sldId="300"/>
@@ -627,7 +635,7 @@
           </ac:picMkLst>
         </pc:picChg>
         <pc:picChg chg="add mod">
-          <ac:chgData name="Ismaël Tuo" userId="fca7baf0e513a1e6" providerId="LiveId" clId="{EED602D2-F677-4216-A5DC-4FF8DE656DE4}" dt="2023-11-12T14:57:52.894" v="7228" actId="1076"/>
+          <ac:chgData name="Ismaël Tuo" userId="fca7baf0e513a1e6" providerId="LiveId" clId="{EED602D2-F677-4216-A5DC-4FF8DE656DE4}" dt="2024-01-14T10:42:50.665" v="14776" actId="1076"/>
           <ac:picMkLst>
             <pc:docMk/>
             <pc:sldMk cId="3618396490" sldId="300"/>
@@ -713,7 +721,7 @@
         </pc:sldMkLst>
       </pc:sldChg>
       <pc:sldChg chg="addSp delSp modSp add mod">
-        <pc:chgData name="Ismaël Tuo" userId="fca7baf0e513a1e6" providerId="LiveId" clId="{EED602D2-F677-4216-A5DC-4FF8DE656DE4}" dt="2023-11-12T16:13:33.478" v="11562" actId="20577"/>
+        <pc:chgData name="Ismaël Tuo" userId="fca7baf0e513a1e6" providerId="LiveId" clId="{EED602D2-F677-4216-A5DC-4FF8DE656DE4}" dt="2024-01-14T10:50:45.076" v="14814" actId="20577"/>
         <pc:sldMkLst>
           <pc:docMk/>
           <pc:sldMk cId="2090591242" sldId="302"/>
@@ -767,7 +775,7 @@
           </ac:spMkLst>
         </pc:spChg>
         <pc:spChg chg="add mod">
-          <ac:chgData name="Ismaël Tuo" userId="fca7baf0e513a1e6" providerId="LiveId" clId="{EED602D2-F677-4216-A5DC-4FF8DE656DE4}" dt="2023-11-12T16:12:51.982" v="11549" actId="313"/>
+          <ac:chgData name="Ismaël Tuo" userId="fca7baf0e513a1e6" providerId="LiveId" clId="{EED602D2-F677-4216-A5DC-4FF8DE656DE4}" dt="2024-01-14T10:50:45.076" v="14814" actId="20577"/>
           <ac:spMkLst>
             <pc:docMk/>
             <pc:sldMk cId="2090591242" sldId="302"/>
@@ -903,7 +911,7 @@
         </pc:picChg>
       </pc:sldChg>
       <pc:sldChg chg="addSp delSp modSp add mod">
-        <pc:chgData name="Ismaël Tuo" userId="fca7baf0e513a1e6" providerId="LiveId" clId="{EED602D2-F677-4216-A5DC-4FF8DE656DE4}" dt="2023-11-12T15:39:53.169" v="9937" actId="114"/>
+        <pc:chgData name="Ismaël Tuo" userId="fca7baf0e513a1e6" providerId="LiveId" clId="{EED602D2-F677-4216-A5DC-4FF8DE656DE4}" dt="2024-01-14T10:37:47.926" v="14760" actId="20577"/>
         <pc:sldMkLst>
           <pc:docMk/>
           <pc:sldMk cId="2497607695" sldId="304"/>
@@ -917,7 +925,7 @@
           </ac:spMkLst>
         </pc:spChg>
         <pc:spChg chg="mod">
-          <ac:chgData name="Ismaël Tuo" userId="fca7baf0e513a1e6" providerId="LiveId" clId="{EED602D2-F677-4216-A5DC-4FF8DE656DE4}" dt="2023-11-12T15:39:53.169" v="9937" actId="114"/>
+          <ac:chgData name="Ismaël Tuo" userId="fca7baf0e513a1e6" providerId="LiveId" clId="{EED602D2-F677-4216-A5DC-4FF8DE656DE4}" dt="2024-01-14T10:37:47.926" v="14760" actId="20577"/>
           <ac:spMkLst>
             <pc:docMk/>
             <pc:sldMk cId="2497607695" sldId="304"/>
@@ -1077,7 +1085,7 @@
         </pc:picChg>
       </pc:sldChg>
       <pc:sldChg chg="addSp delSp modSp add mod">
-        <pc:chgData name="Ismaël Tuo" userId="fca7baf0e513a1e6" providerId="LiveId" clId="{EED602D2-F677-4216-A5DC-4FF8DE656DE4}" dt="2023-11-12T17:58:26.620" v="14711" actId="1076"/>
+        <pc:chgData name="Ismaël Tuo" userId="fca7baf0e513a1e6" providerId="LiveId" clId="{EED602D2-F677-4216-A5DC-4FF8DE656DE4}" dt="2024-01-14T10:45:18.825" v="14811" actId="20577"/>
         <pc:sldMkLst>
           <pc:docMk/>
           <pc:sldMk cId="224177438" sldId="306"/>
@@ -1091,7 +1099,7 @@
           </ac:spMkLst>
         </pc:spChg>
         <pc:spChg chg="mod">
-          <ac:chgData name="Ismaël Tuo" userId="fca7baf0e513a1e6" providerId="LiveId" clId="{EED602D2-F677-4216-A5DC-4FF8DE656DE4}" dt="2023-11-12T15:41:17.503" v="9956" actId="113"/>
+          <ac:chgData name="Ismaël Tuo" userId="fca7baf0e513a1e6" providerId="LiveId" clId="{EED602D2-F677-4216-A5DC-4FF8DE656DE4}" dt="2024-01-14T10:45:18.825" v="14811" actId="20577"/>
           <ac:spMkLst>
             <pc:docMk/>
             <pc:sldMk cId="224177438" sldId="306"/>
@@ -1099,7 +1107,7 @@
           </ac:spMkLst>
         </pc:spChg>
         <pc:spChg chg="mod">
-          <ac:chgData name="Ismaël Tuo" userId="fca7baf0e513a1e6" providerId="LiveId" clId="{EED602D2-F677-4216-A5DC-4FF8DE656DE4}" dt="2023-11-12T15:41:26.161" v="9959" actId="114"/>
+          <ac:chgData name="Ismaël Tuo" userId="fca7baf0e513a1e6" providerId="LiveId" clId="{EED602D2-F677-4216-A5DC-4FF8DE656DE4}" dt="2024-01-14T10:43:36.183" v="14789" actId="20577"/>
           <ac:spMkLst>
             <pc:docMk/>
             <pc:sldMk cId="224177438" sldId="306"/>
@@ -1180,7 +1188,7 @@
         </pc:picChg>
       </pc:sldChg>
       <pc:sldChg chg="addSp delSp modSp add mod">
-        <pc:chgData name="Ismaël Tuo" userId="fca7baf0e513a1e6" providerId="LiveId" clId="{EED602D2-F677-4216-A5DC-4FF8DE656DE4}" dt="2023-11-12T17:58:33.297" v="14714" actId="1076"/>
+        <pc:chgData name="Ismaël Tuo" userId="fca7baf0e513a1e6" providerId="LiveId" clId="{EED602D2-F677-4216-A5DC-4FF8DE656DE4}" dt="2024-01-14T10:44:42.211" v="14798" actId="20577"/>
         <pc:sldMkLst>
           <pc:docMk/>
           <pc:sldMk cId="1141244409" sldId="307"/>
@@ -1194,7 +1202,7 @@
           </ac:spMkLst>
         </pc:spChg>
         <pc:spChg chg="mod">
-          <ac:chgData name="Ismaël Tuo" userId="fca7baf0e513a1e6" providerId="LiveId" clId="{EED602D2-F677-4216-A5DC-4FF8DE656DE4}" dt="2023-11-12T15:41:54.613" v="9967" actId="113"/>
+          <ac:chgData name="Ismaël Tuo" userId="fca7baf0e513a1e6" providerId="LiveId" clId="{EED602D2-F677-4216-A5DC-4FF8DE656DE4}" dt="2024-01-14T10:44:42.211" v="14798" actId="20577"/>
           <ac:spMkLst>
             <pc:docMk/>
             <pc:sldMk cId="1141244409" sldId="307"/>
@@ -1275,7 +1283,7 @@
         </pc:picChg>
       </pc:sldChg>
       <pc:sldChg chg="addSp delSp modSp add mod">
-        <pc:chgData name="Ismaël Tuo" userId="fca7baf0e513a1e6" providerId="LiveId" clId="{EED602D2-F677-4216-A5DC-4FF8DE656DE4}" dt="2023-11-12T17:58:41.368" v="14717" actId="1076"/>
+        <pc:chgData name="Ismaël Tuo" userId="fca7baf0e513a1e6" providerId="LiveId" clId="{EED602D2-F677-4216-A5DC-4FF8DE656DE4}" dt="2024-01-14T10:49:00.889" v="14812" actId="1076"/>
         <pc:sldMkLst>
           <pc:docMk/>
           <pc:sldMk cId="3021006989" sldId="308"/>
@@ -1305,7 +1313,7 @@
           </ac:spMkLst>
         </pc:spChg>
         <pc:spChg chg="mod">
-          <ac:chgData name="Ismaël Tuo" userId="fca7baf0e513a1e6" providerId="LiveId" clId="{EED602D2-F677-4216-A5DC-4FF8DE656DE4}" dt="2023-11-12T15:43:08.928" v="10133" actId="20577"/>
+          <ac:chgData name="Ismaël Tuo" userId="fca7baf0e513a1e6" providerId="LiveId" clId="{EED602D2-F677-4216-A5DC-4FF8DE656DE4}" dt="2024-01-14T10:49:00.889" v="14812" actId="1076"/>
           <ac:spMkLst>
             <pc:docMk/>
             <pc:sldMk cId="3021006989" sldId="308"/>
@@ -1472,7 +1480,7 @@
         </pc:sldMkLst>
       </pc:sldChg>
       <pc:sldChg chg="addSp modSp add mod">
-        <pc:chgData name="Ismaël Tuo" userId="fca7baf0e513a1e6" providerId="LiveId" clId="{EED602D2-F677-4216-A5DC-4FF8DE656DE4}" dt="2023-11-12T16:52:07.621" v="14702" actId="113"/>
+        <pc:chgData name="Ismaël Tuo" userId="fca7baf0e513a1e6" providerId="LiveId" clId="{EED602D2-F677-4216-A5DC-4FF8DE656DE4}" dt="2024-01-14T10:54:46.721" v="14851" actId="20577"/>
         <pc:sldMkLst>
           <pc:docMk/>
           <pc:sldMk cId="3897783148" sldId="310"/>
@@ -1502,7 +1510,7 @@
           </ac:spMkLst>
         </pc:spChg>
         <pc:spChg chg="mod">
-          <ac:chgData name="Ismaël Tuo" userId="fca7baf0e513a1e6" providerId="LiveId" clId="{EED602D2-F677-4216-A5DC-4FF8DE656DE4}" dt="2023-11-12T16:26:07.949" v="12654" actId="1076"/>
+          <ac:chgData name="Ismaël Tuo" userId="fca7baf0e513a1e6" providerId="LiveId" clId="{EED602D2-F677-4216-A5DC-4FF8DE656DE4}" dt="2024-01-14T10:54:46.721" v="14851" actId="20577"/>
           <ac:spMkLst>
             <pc:docMk/>
             <pc:sldMk cId="3897783148" sldId="310"/>
@@ -1519,7 +1527,7 @@
         </pc:spChg>
       </pc:sldChg>
       <pc:sldChg chg="modSp add mod">
-        <pc:chgData name="Ismaël Tuo" userId="fca7baf0e513a1e6" providerId="LiveId" clId="{EED602D2-F677-4216-A5DC-4FF8DE656DE4}" dt="2023-11-12T16:52:10.671" v="14703" actId="113"/>
+        <pc:chgData name="Ismaël Tuo" userId="fca7baf0e513a1e6" providerId="LiveId" clId="{EED602D2-F677-4216-A5DC-4FF8DE656DE4}" dt="2024-01-14T10:56:08.974" v="14853" actId="20577"/>
         <pc:sldMkLst>
           <pc:docMk/>
           <pc:sldMk cId="643093169" sldId="311"/>
@@ -1541,7 +1549,7 @@
           </ac:spMkLst>
         </pc:spChg>
         <pc:spChg chg="mod">
-          <ac:chgData name="Ismaël Tuo" userId="fca7baf0e513a1e6" providerId="LiveId" clId="{EED602D2-F677-4216-A5DC-4FF8DE656DE4}" dt="2023-11-12T16:45:57.192" v="14699" actId="1076"/>
+          <ac:chgData name="Ismaël Tuo" userId="fca7baf0e513a1e6" providerId="LiveId" clId="{EED602D2-F677-4216-A5DC-4FF8DE656DE4}" dt="2024-01-14T10:56:08.974" v="14853" actId="20577"/>
           <ac:spMkLst>
             <pc:docMk/>
             <pc:sldMk cId="643093169" sldId="311"/>
@@ -1636,7 +1644,7 @@
           <a:p>
             <a:fld id="{5D1B8971-FAD5-A544-A565-5C81831E2E08}" type="datetimeFigureOut">
               <a:rPr lang="fr-FR" smtClean="0"/>
-              <a:t>12/11/2023</a:t>
+              <a:t>14/01/2024</a:t>
             </a:fld>
             <a:endParaRPr lang="fr-FR"/>
           </a:p>
@@ -2066,7 +2074,7 @@
           <a:p>
             <a:fld id="{446AF453-C717-E044-9B61-C449088DBB9F}" type="datetime1">
               <a:rPr lang="fr-FR" smtClean="0"/>
-              <a:t>12/11/2023</a:t>
+              <a:t>14/01/2024</a:t>
             </a:fld>
             <a:endParaRPr lang="fr-FR"/>
           </a:p>
@@ -2240,7 +2248,7 @@
           <a:p>
             <a:fld id="{0AD74B8B-4B66-A54B-A7E1-EB9F6C09CE67}" type="datetime1">
               <a:rPr lang="fr-FR" smtClean="0"/>
-              <a:t>12/11/2023</a:t>
+              <a:t>14/01/2024</a:t>
             </a:fld>
             <a:endParaRPr lang="fr-FR"/>
           </a:p>
@@ -2424,7 +2432,7 @@
           <a:p>
             <a:fld id="{9584F9F2-42A0-CD42-8013-986AEAF97421}" type="datetime1">
               <a:rPr lang="fr-FR" smtClean="0"/>
-              <a:t>12/11/2023</a:t>
+              <a:t>14/01/2024</a:t>
             </a:fld>
             <a:endParaRPr lang="fr-FR"/>
           </a:p>
@@ -2598,7 +2606,7 @@
           <a:p>
             <a:fld id="{DAB9BD9F-3179-BB4C-96AB-C40862581685}" type="datetime1">
               <a:rPr lang="fr-FR" smtClean="0"/>
-              <a:t>12/11/2023</a:t>
+              <a:t>14/01/2024</a:t>
             </a:fld>
             <a:endParaRPr lang="fr-FR"/>
           </a:p>
@@ -2870,7 +2878,7 @@
           <a:p>
             <a:fld id="{A664DE96-64FF-BC43-8A9C-18ED43A528D6}" type="datetime1">
               <a:rPr lang="fr-FR" smtClean="0"/>
-              <a:t>12/11/2023</a:t>
+              <a:t>14/01/2024</a:t>
             </a:fld>
             <a:endParaRPr lang="fr-FR"/>
           </a:p>
@@ -3106,7 +3114,7 @@
           <a:p>
             <a:fld id="{2C8FE800-9F9B-1C4F-A1CD-9EF46842C4CA}" type="datetime1">
               <a:rPr lang="fr-FR" smtClean="0"/>
-              <a:t>12/11/2023</a:t>
+              <a:t>14/01/2024</a:t>
             </a:fld>
             <a:endParaRPr lang="fr-FR"/>
           </a:p>
@@ -3469,7 +3477,7 @@
           <a:p>
             <a:fld id="{0F7DED4E-8CB4-EF40-A349-EFC02EC7784E}" type="datetime1">
               <a:rPr lang="fr-FR" smtClean="0"/>
-              <a:t>12/11/2023</a:t>
+              <a:t>14/01/2024</a:t>
             </a:fld>
             <a:endParaRPr lang="fr-FR"/>
           </a:p>
@@ -3614,7 +3622,7 @@
           <a:p>
             <a:fld id="{5BB88D77-E8A2-E24F-81D2-817E60779F3E}" type="datetime1">
               <a:rPr lang="fr-FR" smtClean="0"/>
-              <a:t>12/11/2023</a:t>
+              <a:t>14/01/2024</a:t>
             </a:fld>
             <a:endParaRPr lang="fr-FR"/>
           </a:p>
@@ -3713,7 +3721,7 @@
           <a:p>
             <a:fld id="{817F964E-5B57-884A-A1B8-925BFA5276AF}" type="datetime1">
               <a:rPr lang="fr-FR" smtClean="0"/>
-              <a:t>12/11/2023</a:t>
+              <a:t>14/01/2024</a:t>
             </a:fld>
             <a:endParaRPr lang="fr-FR"/>
           </a:p>
@@ -4074,7 +4082,7 @@
           <a:p>
             <a:fld id="{D5636CD0-A2E6-1543-A0E5-C829C16FEE55}" type="datetime1">
               <a:rPr lang="fr-FR" smtClean="0"/>
-              <a:t>12/11/2023</a:t>
+              <a:t>14/01/2024</a:t>
             </a:fld>
             <a:endParaRPr lang="fr-FR"/>
           </a:p>
@@ -4435,7 +4443,7 @@
           <a:p>
             <a:fld id="{CEE5CE4A-5B1A-1846-BA66-722BDB7A9525}" type="datetime1">
               <a:rPr lang="fr-FR" smtClean="0"/>
-              <a:t>12/11/2023</a:t>
+              <a:t>14/01/2024</a:t>
             </a:fld>
             <a:endParaRPr lang="fr-FR"/>
           </a:p>
@@ -4682,7 +4690,7 @@
           <a:p>
             <a:fld id="{55A13D9C-CA6E-9C45-8634-4423EBFFD553}" type="datetime1">
               <a:rPr lang="fr-FR" smtClean="0"/>
-              <a:t>12/11/2023</a:t>
+              <a:t>14/01/2024</a:t>
             </a:fld>
             <a:endParaRPr lang="fr-FR"/>
           </a:p>
@@ -5804,7 +5812,7 @@
                 <a:latin typeface="Times New Roman" panose="02020603050405020304" pitchFamily="18" charset="0"/>
                 <a:cs typeface="Times New Roman" panose="02020603050405020304" pitchFamily="18" charset="0"/>
               </a:rPr>
-              <a:t>qui permet d’exécuter un code si aucune erreur n’est trouvée par exemple au lieu de calculer et afficher le résultat de la division dans le bloc </a:t>
+              <a:t>qui permet d’exécuter un code si aucune erreur n’est trouvée. Par exemple au lieu de calculer et afficher le résultat de la division dans le bloc </a:t>
             </a:r>
             <a:r>
               <a:rPr lang="fr-FR" b="1" i="1" dirty="0" err="1">
@@ -5950,10 +5958,10 @@
       </p:sp>
       <p:pic>
         <p:nvPicPr>
-          <p:cNvPr id="11" name="Image 10">
-            <a:extLst>
-              <a:ext uri="{FF2B5EF4-FFF2-40B4-BE49-F238E27FC236}">
-                <a16:creationId xmlns:a16="http://schemas.microsoft.com/office/drawing/2014/main" id="{FD2FEA0A-B53A-3BA0-1DD1-02987D375A84}"/>
+          <p:cNvPr id="13" name="Image 12">
+            <a:extLst>
+              <a:ext uri="{FF2B5EF4-FFF2-40B4-BE49-F238E27FC236}">
+                <a16:creationId xmlns:a16="http://schemas.microsoft.com/office/drawing/2014/main" id="{B7E75558-7612-B162-21BD-5DF6D63A52B2}"/>
               </a:ext>
             </a:extLst>
           </p:cNvPr>
@@ -5970,8 +5978,8 @@
         </p:blipFill>
         <p:spPr>
           <a:xfrm>
-            <a:off x="709162" y="3351763"/>
-            <a:ext cx="4663844" cy="2484335"/>
+            <a:off x="6438235" y="3306091"/>
+            <a:ext cx="4892464" cy="2400508"/>
           </a:xfrm>
           <a:prstGeom prst="rect">
             <a:avLst/>
@@ -5980,10 +5988,10 @@
       </p:pic>
       <p:pic>
         <p:nvPicPr>
-          <p:cNvPr id="13" name="Image 12">
-            <a:extLst>
-              <a:ext uri="{FF2B5EF4-FFF2-40B4-BE49-F238E27FC236}">
-                <a16:creationId xmlns:a16="http://schemas.microsoft.com/office/drawing/2014/main" id="{B7E75558-7612-B162-21BD-5DF6D63A52B2}"/>
+          <p:cNvPr id="7" name="Image 6">
+            <a:extLst>
+              <a:ext uri="{FF2B5EF4-FFF2-40B4-BE49-F238E27FC236}">
+                <a16:creationId xmlns:a16="http://schemas.microsoft.com/office/drawing/2014/main" id="{EADB19E2-3CD0-146C-A8F9-F3E1FD6EDD5A}"/>
               </a:ext>
             </a:extLst>
           </p:cNvPr>
@@ -6000,8 +6008,8 @@
         </p:blipFill>
         <p:spPr>
           <a:xfrm>
-            <a:off x="6510663" y="3478106"/>
-            <a:ext cx="4892464" cy="2400508"/>
+            <a:off x="581887" y="3306091"/>
+            <a:ext cx="4038950" cy="2400508"/>
           </a:xfrm>
           <a:prstGeom prst="rect">
             <a:avLst/>
@@ -6129,7 +6137,7 @@
                 <a:latin typeface="Times New Roman" panose="02020603050405020304" pitchFamily="18" charset="0"/>
                 <a:cs typeface="Times New Roman" panose="02020603050405020304" pitchFamily="18" charset="0"/>
               </a:rPr>
-              <a:t>Exemple de </a:t>
+              <a:t>Exemple </a:t>
             </a:r>
             <a:r>
               <a:rPr lang="fr-FR" sz="2400" b="1" i="1" dirty="0" err="1">
@@ -6736,7 +6744,7 @@
                 <a:latin typeface="Times New Roman" panose="02020603050405020304" pitchFamily="18" charset="0"/>
                 <a:cs typeface="Times New Roman" panose="02020603050405020304" pitchFamily="18" charset="0"/>
               </a:rPr>
-              <a:t>Exemple de </a:t>
+              <a:t>Exemple </a:t>
             </a:r>
             <a:r>
               <a:rPr lang="fr-FR" sz="2400" b="1" i="1" dirty="0" err="1">
@@ -7924,7 +7932,7 @@
         </p:nvSpPr>
         <p:spPr>
           <a:xfrm>
-            <a:off x="500931" y="822661"/>
+            <a:off x="482430" y="816243"/>
             <a:ext cx="11088982" cy="400110"/>
           </a:xfrm>
           <a:prstGeom prst="rect">
@@ -8722,7 +8730,7 @@
                 <a:latin typeface="Times New Roman" panose="02020603050405020304" pitchFamily="18" charset="0"/>
                 <a:cs typeface="Times New Roman" panose="02020603050405020304" pitchFamily="18" charset="0"/>
               </a:rPr>
-              <a:t>L’exécution du programme précèdent lèvera une exception dans le cas où on saisit un nombre négatif ou nulle.</a:t>
+              <a:t>L’exécution du programme précèdent lèvera une exception dans le cas où on saisit un nombre négatif ou nul.</a:t>
             </a:r>
             <a:endParaRPr lang="fr-FR" i="1" dirty="0">
               <a:latin typeface="Times New Roman" panose="02020603050405020304" pitchFamily="18" charset="0"/>
@@ -9293,7 +9301,7 @@
                 <a:latin typeface="Times New Roman" panose="02020603050405020304" pitchFamily="18" charset="0"/>
                 <a:cs typeface="Times New Roman" panose="02020603050405020304" pitchFamily="18" charset="0"/>
               </a:rPr>
-              <a:t>Créer un fichier main.py qui va utiliser l’ensemble des fonctions des modules précédents pour faire réaliser une calculatrice simple.</a:t>
+              <a:t>Créer un fichier main.py qui va utiliser l’ensemble des fonctions des modules précédents pour réaliser une calculatrice simple.</a:t>
             </a:r>
           </a:p>
           <a:p>
@@ -9316,7 +9324,14 @@
                 <a:latin typeface="Times New Roman" panose="02020603050405020304" pitchFamily="18" charset="0"/>
                 <a:cs typeface="Times New Roman" panose="02020603050405020304" pitchFamily="18" charset="0"/>
               </a:rPr>
-              <a:t>/catch</a:t>
+              <a:t>/</a:t>
+            </a:r>
+            <a:r>
+              <a:rPr lang="fr-FR" b="1" i="1" dirty="0" err="1">
+                <a:latin typeface="Times New Roman" panose="02020603050405020304" pitchFamily="18" charset="0"/>
+                <a:cs typeface="Times New Roman" panose="02020603050405020304" pitchFamily="18" charset="0"/>
+              </a:rPr>
+              <a:t>except</a:t>
             </a:r>
             <a:r>
               <a:rPr lang="fr-FR" i="1" dirty="0">
@@ -10028,7 +10043,7 @@
                 <a:latin typeface="Times New Roman" panose="02020603050405020304" pitchFamily="18" charset="0"/>
                 <a:cs typeface="Times New Roman" panose="02020603050405020304" pitchFamily="18" charset="0"/>
               </a:rPr>
-              <a:t>Le rôle de ce programme est d’importer la fonction </a:t>
+              <a:t>Le but de ce programme est d’importer la fonction </a:t>
             </a:r>
             <a:r>
               <a:rPr lang="fr-FR" b="1" i="1" dirty="0" err="1">
@@ -10063,7 +10078,7 @@
                 <a:latin typeface="Times New Roman" panose="02020603050405020304" pitchFamily="18" charset="0"/>
                 <a:cs typeface="Times New Roman" panose="02020603050405020304" pitchFamily="18" charset="0"/>
               </a:rPr>
-              <a:t>ensuite votre rôle est de comprendre comment utiliser cette fonction. Ensuite demander à l’utilisateur les paramètres d’entrées et appeler la fonction avec la fonction avec les paramètres fournis par l’utilisateur.</a:t>
+              <a:t>ensuite votre rôle est de comprendre comment utiliser cette fonction. Demander à l’utilisateur les paramètres d’entrées et appeler la fonction avec les paramètres fournis par l’utilisateur.</a:t>
             </a:r>
           </a:p>
           <a:p>
@@ -10095,7 +10110,14 @@
                 <a:latin typeface="Times New Roman" panose="02020603050405020304" pitchFamily="18" charset="0"/>
                 <a:cs typeface="Times New Roman" panose="02020603050405020304" pitchFamily="18" charset="0"/>
               </a:rPr>
-              <a:t>/catch</a:t>
+              <a:t>/</a:t>
+            </a:r>
+            <a:r>
+              <a:rPr lang="fr-FR" b="1" i="1" dirty="0" err="1">
+                <a:latin typeface="Times New Roman" panose="02020603050405020304" pitchFamily="18" charset="0"/>
+                <a:cs typeface="Times New Roman" panose="02020603050405020304" pitchFamily="18" charset="0"/>
+              </a:rPr>
+              <a:t>except</a:t>
             </a:r>
             <a:r>
               <a:rPr lang="fr-FR" i="1" dirty="0">
@@ -10566,7 +10588,21 @@
                 <a:latin typeface="Times New Roman" panose="02020603050405020304" pitchFamily="18" charset="0"/>
                 <a:cs typeface="Times New Roman" panose="02020603050405020304" pitchFamily="18" charset="0"/>
               </a:rPr>
-              <a:t>L’utilisateur devra faire un choix du mode au départ ensuite on affiche les questions l’une à la suite de l’autre.</a:t>
+              <a:t>L’utilisateur devra faire un </a:t>
+            </a:r>
+            <a:r>
+              <a:rPr lang="fr-FR">
+                <a:latin typeface="Times New Roman" panose="02020603050405020304" pitchFamily="18" charset="0"/>
+                <a:cs typeface="Times New Roman" panose="02020603050405020304" pitchFamily="18" charset="0"/>
+              </a:rPr>
+              <a:t>choix de </a:t>
+            </a:r>
+            <a:r>
+              <a:rPr lang="fr-FR" dirty="0">
+                <a:latin typeface="Times New Roman" panose="02020603050405020304" pitchFamily="18" charset="0"/>
+                <a:cs typeface="Times New Roman" panose="02020603050405020304" pitchFamily="18" charset="0"/>
+              </a:rPr>
+              <a:t>mode au départ ensuite on affiche les questions l’une à la suite de l’autre.</a:t>
             </a:r>
           </a:p>
           <a:p>
@@ -10973,7 +11009,7 @@
                 <a:cs typeface="Times New Roman" panose="02020603050405020304" pitchFamily="18" charset="0"/>
                 <a:hlinkClick r:id="rId8" action="ppaction://hlinksldjump"/>
               </a:rPr>
-              <a:t>Exemple de </a:t>
+              <a:t>Exemple </a:t>
             </a:r>
             <a:r>
               <a:rPr lang="fr-FR" sz="2800" i="1" dirty="0" err="1">
@@ -11039,7 +11075,7 @@
                 <a:cs typeface="Times New Roman" panose="02020603050405020304" pitchFamily="18" charset="0"/>
                 <a:hlinkClick r:id="rId9" action="ppaction://hlinksldjump"/>
               </a:rPr>
-              <a:t>Exemple de </a:t>
+              <a:t>Exemple </a:t>
             </a:r>
             <a:r>
               <a:rPr lang="fr-FR" sz="2800" i="1" dirty="0" err="1">
@@ -11580,7 +11616,7 @@
                 <a:latin typeface="Times New Roman" panose="02020603050405020304" pitchFamily="18" charset="0"/>
                 <a:cs typeface="Times New Roman" panose="02020603050405020304" pitchFamily="18" charset="0"/>
               </a:rPr>
-              <a:t>Tous les programmes réalisés dans les chapitres précédents fonctionnent uniquement dans le cas où l’utilisateur entre une valeur attendu dans le cas où il entre une valeur inattendu le programme va générer une erreur.</a:t>
+              <a:t>Tous les programmes réalisés dans les chapitres précédents fonctionnent uniquement dans le cas où l’utilisateur entre une valeur attendu, dans le cas où il entre une valeur inattendu le programme va générer une erreur.</a:t>
             </a:r>
           </a:p>
         </p:txBody>
@@ -11700,7 +11736,7 @@
                 <a:latin typeface="Times New Roman" panose="02020603050405020304" pitchFamily="18" charset="0"/>
                 <a:cs typeface="Times New Roman" panose="02020603050405020304" pitchFamily="18" charset="0"/>
               </a:rPr>
-              <a:t>On voit que Python génère une erreur quand on ne fournit pas un nombre comme attendu. Tout code écrit après ne sera pas traité et le programme s’arrête là dès qu’une erreur est rencontrée.</a:t>
+              <a:t>On voit que Python génère une erreur quand on ne fournit pas un nombre comme attendu. Tout code écrit après ne sera pas traité et le programme s’arrête dès qu’une erreur est rencontrée.</a:t>
             </a:r>
           </a:p>
         </p:txBody>
@@ -11969,7 +12005,7 @@
                 <a:latin typeface="Times New Roman" panose="02020603050405020304" pitchFamily="18" charset="0"/>
                 <a:cs typeface="Times New Roman" panose="02020603050405020304" pitchFamily="18" charset="0"/>
               </a:rPr>
-              <a:t>Le code précédent a échoué parce que nous n’avons pas préparé notre code à faire face à ce genre d’erreur. Quand Python tombe sur une exception, il exécute le code qui doit être exécuté lors d’une exception sinon il affiche une erreur comme précédemment.</a:t>
+              <a:t>Le code précédent a échoué parce que nous n’avons pas préparé notre code à faire face à ce genre d’erreur. Quand Python tombe sur une exception, il exécute le code qui doit être exécuté lors de l’exception sinon il affiche une erreur comme précédemment.</a:t>
             </a:r>
           </a:p>
         </p:txBody>
@@ -12143,7 +12179,7 @@
                 <a:latin typeface="Times New Roman" panose="02020603050405020304" pitchFamily="18" charset="0"/>
                 <a:cs typeface="Times New Roman" panose="02020603050405020304" pitchFamily="18" charset="0"/>
               </a:rPr>
-              <a:t>. Par exemple dans l’exemple précédent on aurait pu redemander le nombre à l’utilisateur quand il saisit autre chose qu’un nombre.</a:t>
+              <a:t>. Dans l’exemple précédent on aurait pu redemander le nombre à l’utilisateur quand il saisit autre chose qu’un nombre.</a:t>
             </a:r>
           </a:p>
         </p:txBody>
@@ -12712,7 +12748,7 @@
           <a:lstStyle/>
           <a:p>
             <a:r>
-              <a:rPr lang="fr-FR"/>
+              <a:rPr lang="fr-FR" dirty="0"/>
               <a:t>Cours: Python | Auteur: TUO N. Ismaël Maurice 
 </a:t>
             </a:r>
@@ -13326,7 +13362,7 @@
                 <a:latin typeface="Times New Roman" panose="02020603050405020304" pitchFamily="18" charset="0"/>
                 <a:cs typeface="Times New Roman" panose="02020603050405020304" pitchFamily="18" charset="0"/>
               </a:rPr>
-              <a:t>Chaque exception levée par Python dispose d’un type par exemple on peut avoir les exceptions suivantes dans le cas de la division entre deux nombres:</a:t>
+              <a:t>Chaque exception levée par Python dispose d’un type, par exemple on peut avoir les exceptions suivantes dans le cas de la division entre deux nombres:</a:t>
             </a:r>
           </a:p>
           <a:p>
@@ -13380,7 +13416,7 @@
                 <a:latin typeface="Times New Roman" panose="02020603050405020304" pitchFamily="18" charset="0"/>
                 <a:cs typeface="Times New Roman" panose="02020603050405020304" pitchFamily="18" charset="0"/>
               </a:rPr>
-              <a:t>générée lors d’une erreur de conversion quand on essaye de convertir par exemple une chaine de caractères comme « </a:t>
+              <a:t>générée lors d’une erreur de conversion quand on essaye de convertir une chaine de caractères comme « </a:t>
             </a:r>
             <a:r>
               <a:rPr lang="fr-FR" dirty="0" err="1">
@@ -13684,7 +13720,7 @@
                 <a:latin typeface="Times New Roman" panose="02020603050405020304" pitchFamily="18" charset="0"/>
                 <a:cs typeface="Times New Roman" panose="02020603050405020304" pitchFamily="18" charset="0"/>
               </a:rPr>
-              <a:t>On peut capturer l’exception et afficher son message grâce au mot clé </a:t>
+              <a:t>On peut capturer une exception et afficher son message grâce au mot clé </a:t>
             </a:r>
             <a:r>
               <a:rPr lang="fr-FR" b="1" i="1" dirty="0">

</xml_diff>